<commit_message>
Upload template with date axis set to auto instead of months
</commit_message>
<xml_diff>
--- a/src/main/resources/com/hp/autonomy/frontend/reports/powerpoint/templates/template.pptx
+++ b/src/main/resources/com/hp/autonomy/frontend/reports/powerpoint/templates/template.pptx
@@ -1094,8 +1094,8 @@
         </c:dLbls>
         <c:marker val="1"/>
         <c:smooth val="0"/>
-        <c:axId val="231749440"/>
-        <c:axId val="174243680"/>
+        <c:axId val="403523240"/>
+        <c:axId val="403523632"/>
       </c:lineChart>
       <c:lineChart>
         <c:grouping val="standard"/>
@@ -1394,11 +1394,11 @@
         </c:dLbls>
         <c:marker val="1"/>
         <c:smooth val="0"/>
-        <c:axId val="174244464"/>
-        <c:axId val="174244072"/>
+        <c:axId val="126851624"/>
+        <c:axId val="403524024"/>
       </c:lineChart>
       <c:dateAx>
-        <c:axId val="231749440"/>
+        <c:axId val="403523240"/>
         <c:scaling>
           <c:orientation val="minMax"/>
         </c:scaling>
@@ -1441,14 +1441,14 @@
             <a:endParaRPr lang="en-US"/>
           </a:p>
         </c:txPr>
-        <c:crossAx val="174243680"/>
+        <c:crossAx val="403523632"/>
         <c:crosses val="autoZero"/>
         <c:auto val="0"/>
         <c:lblOffset val="100"/>
         <c:baseTimeUnit val="months"/>
       </c:dateAx>
       <c:valAx>
-        <c:axId val="174243680"/>
+        <c:axId val="403523632"/>
         <c:scaling>
           <c:orientation val="minMax"/>
         </c:scaling>
@@ -1499,12 +1499,12 @@
             <a:endParaRPr lang="en-US"/>
           </a:p>
         </c:txPr>
-        <c:crossAx val="231749440"/>
+        <c:crossAx val="403523240"/>
         <c:crosses val="autoZero"/>
         <c:crossBetween val="between"/>
       </c:valAx>
       <c:valAx>
-        <c:axId val="174244072"/>
+        <c:axId val="403524024"/>
         <c:scaling>
           <c:orientation val="minMax"/>
         </c:scaling>
@@ -1541,12 +1541,12 @@
             <a:endParaRPr lang="en-US"/>
           </a:p>
         </c:txPr>
-        <c:crossAx val="174244464"/>
+        <c:crossAx val="126851624"/>
         <c:crosses val="max"/>
         <c:crossBetween val="between"/>
       </c:valAx>
       <c:dateAx>
-        <c:axId val="174244464"/>
+        <c:axId val="126851624"/>
         <c:scaling>
           <c:orientation val="minMax"/>
         </c:scaling>
@@ -1556,7 +1556,7 @@
         <c:majorTickMark val="out"/>
         <c:minorTickMark val="none"/>
         <c:tickLblPos val="nextTo"/>
-        <c:crossAx val="174244072"/>
+        <c:crossAx val="403524024"/>
         <c:crosses val="autoZero"/>
         <c:auto val="1"/>
         <c:lblOffset val="100"/>
@@ -2880,7 +2880,7 @@
           <a:p>
             <a:fld id="{883BD084-2C06-41D0-A826-B3CA4EDA1986}" type="datetimeFigureOut">
               <a:rPr lang="en-GB" smtClean="0"/>
-              <a:t>06/02/2017</a:t>
+              <a:t>16/02/2017</a:t>
             </a:fld>
             <a:endParaRPr lang="en-GB"/>
           </a:p>
@@ -3050,7 +3050,7 @@
           <a:p>
             <a:fld id="{883BD084-2C06-41D0-A826-B3CA4EDA1986}" type="datetimeFigureOut">
               <a:rPr lang="en-GB" smtClean="0"/>
-              <a:t>06/02/2017</a:t>
+              <a:t>16/02/2017</a:t>
             </a:fld>
             <a:endParaRPr lang="en-GB"/>
           </a:p>
@@ -3230,7 +3230,7 @@
           <a:p>
             <a:fld id="{883BD084-2C06-41D0-A826-B3CA4EDA1986}" type="datetimeFigureOut">
               <a:rPr lang="en-GB" smtClean="0"/>
-              <a:t>06/02/2017</a:t>
+              <a:t>16/02/2017</a:t>
             </a:fld>
             <a:endParaRPr lang="en-GB"/>
           </a:p>
@@ -3400,7 +3400,7 @@
           <a:p>
             <a:fld id="{883BD084-2C06-41D0-A826-B3CA4EDA1986}" type="datetimeFigureOut">
               <a:rPr lang="en-GB" smtClean="0"/>
-              <a:t>06/02/2017</a:t>
+              <a:t>16/02/2017</a:t>
             </a:fld>
             <a:endParaRPr lang="en-GB"/>
           </a:p>
@@ -3646,7 +3646,7 @@
           <a:p>
             <a:fld id="{883BD084-2C06-41D0-A826-B3CA4EDA1986}" type="datetimeFigureOut">
               <a:rPr lang="en-GB" smtClean="0"/>
-              <a:t>06/02/2017</a:t>
+              <a:t>16/02/2017</a:t>
             </a:fld>
             <a:endParaRPr lang="en-GB"/>
           </a:p>
@@ -3878,7 +3878,7 @@
           <a:p>
             <a:fld id="{883BD084-2C06-41D0-A826-B3CA4EDA1986}" type="datetimeFigureOut">
               <a:rPr lang="en-GB" smtClean="0"/>
-              <a:t>06/02/2017</a:t>
+              <a:t>16/02/2017</a:t>
             </a:fld>
             <a:endParaRPr lang="en-GB"/>
           </a:p>
@@ -4245,7 +4245,7 @@
           <a:p>
             <a:fld id="{883BD084-2C06-41D0-A826-B3CA4EDA1986}" type="datetimeFigureOut">
               <a:rPr lang="en-GB" smtClean="0"/>
-              <a:t>06/02/2017</a:t>
+              <a:t>16/02/2017</a:t>
             </a:fld>
             <a:endParaRPr lang="en-GB"/>
           </a:p>
@@ -4363,7 +4363,7 @@
           <a:p>
             <a:fld id="{883BD084-2C06-41D0-A826-B3CA4EDA1986}" type="datetimeFigureOut">
               <a:rPr lang="en-GB" smtClean="0"/>
-              <a:t>06/02/2017</a:t>
+              <a:t>16/02/2017</a:t>
             </a:fld>
             <a:endParaRPr lang="en-GB"/>
           </a:p>
@@ -4458,7 +4458,7 @@
           <a:p>
             <a:fld id="{883BD084-2C06-41D0-A826-B3CA4EDA1986}" type="datetimeFigureOut">
               <a:rPr lang="en-GB" smtClean="0"/>
-              <a:t>06/02/2017</a:t>
+              <a:t>16/02/2017</a:t>
             </a:fld>
             <a:endParaRPr lang="en-GB"/>
           </a:p>
@@ -4735,7 +4735,7 @@
           <a:p>
             <a:fld id="{883BD084-2C06-41D0-A826-B3CA4EDA1986}" type="datetimeFigureOut">
               <a:rPr lang="en-GB" smtClean="0"/>
-              <a:t>06/02/2017</a:t>
+              <a:t>16/02/2017</a:t>
             </a:fld>
             <a:endParaRPr lang="en-GB"/>
           </a:p>
@@ -4988,7 +4988,7 @@
           <a:p>
             <a:fld id="{883BD084-2C06-41D0-A826-B3CA4EDA1986}" type="datetimeFigureOut">
               <a:rPr lang="en-GB" smtClean="0"/>
-              <a:t>06/02/2017</a:t>
+              <a:t>16/02/2017</a:t>
             </a:fld>
             <a:endParaRPr lang="en-GB"/>
           </a:p>
@@ -5201,7 +5201,7 @@
           <a:p>
             <a:fld id="{883BD084-2C06-41D0-A826-B3CA4EDA1986}" type="datetimeFigureOut">
               <a:rPr lang="en-GB" smtClean="0"/>
-              <a:t>06/02/2017</a:t>
+              <a:t>16/02/2017</a:t>
             </a:fld>
             <a:endParaRPr lang="en-GB"/>
           </a:p>

</xml_diff>

<commit_message>
Date axis auto doesn't seem to work properly; set to days, which seems to work okay with data both on a month and day range.
</commit_message>
<xml_diff>
--- a/src/main/resources/com/hp/autonomy/frontend/reports/powerpoint/templates/template.pptx
+++ b/src/main/resources/com/hp/autonomy/frontend/reports/powerpoint/templates/template.pptx
@@ -1094,8 +1094,8 @@
         </c:dLbls>
         <c:marker val="1"/>
         <c:smooth val="0"/>
-        <c:axId val="403523240"/>
-        <c:axId val="403523632"/>
+        <c:axId val="89255024"/>
+        <c:axId val="6352864"/>
       </c:lineChart>
       <c:lineChart>
         <c:grouping val="standard"/>
@@ -1394,11 +1394,11 @@
         </c:dLbls>
         <c:marker val="1"/>
         <c:smooth val="0"/>
-        <c:axId val="126851624"/>
-        <c:axId val="403524024"/>
+        <c:axId val="133037912"/>
+        <c:axId val="133037528"/>
       </c:lineChart>
       <c:dateAx>
-        <c:axId val="403523240"/>
+        <c:axId val="89255024"/>
         <c:scaling>
           <c:orientation val="minMax"/>
         </c:scaling>
@@ -1441,14 +1441,14 @@
             <a:endParaRPr lang="en-US"/>
           </a:p>
         </c:txPr>
-        <c:crossAx val="403523632"/>
+        <c:crossAx val="6352864"/>
         <c:crosses val="autoZero"/>
         <c:auto val="0"/>
         <c:lblOffset val="100"/>
-        <c:baseTimeUnit val="months"/>
+        <c:baseTimeUnit val="days"/>
       </c:dateAx>
       <c:valAx>
-        <c:axId val="403523632"/>
+        <c:axId val="6352864"/>
         <c:scaling>
           <c:orientation val="minMax"/>
         </c:scaling>
@@ -1499,12 +1499,12 @@
             <a:endParaRPr lang="en-US"/>
           </a:p>
         </c:txPr>
-        <c:crossAx val="403523240"/>
+        <c:crossAx val="89255024"/>
         <c:crosses val="autoZero"/>
         <c:crossBetween val="between"/>
       </c:valAx>
       <c:valAx>
-        <c:axId val="403524024"/>
+        <c:axId val="133037528"/>
         <c:scaling>
           <c:orientation val="minMax"/>
         </c:scaling>
@@ -1541,12 +1541,12 @@
             <a:endParaRPr lang="en-US"/>
           </a:p>
         </c:txPr>
-        <c:crossAx val="126851624"/>
+        <c:crossAx val="133037912"/>
         <c:crosses val="max"/>
         <c:crossBetween val="between"/>
       </c:valAx>
       <c:dateAx>
-        <c:axId val="126851624"/>
+        <c:axId val="133037912"/>
         <c:scaling>
           <c:orientation val="minMax"/>
         </c:scaling>
@@ -1556,7 +1556,7 @@
         <c:majorTickMark val="out"/>
         <c:minorTickMark val="none"/>
         <c:tickLblPos val="nextTo"/>
-        <c:crossAx val="403524024"/>
+        <c:crossAx val="133037528"/>
         <c:crosses val="autoZero"/>
         <c:auto val="1"/>
         <c:lblOffset val="100"/>

</xml_diff>

<commit_message>
Use a template without the 3rd chart series; avoids it appearing if you create a date graph with exactly two series with one on the primary y-axis and one on the secondary y-axis.
</commit_message>
<xml_diff>
--- a/src/main/resources/com/hp/autonomy/frontend/reports/powerpoint/templates/template.pptx
+++ b/src/main/resources/com/hp/autonomy/frontend/reports/powerpoint/templates/template.pptx
@@ -1094,8 +1094,8 @@
         </c:dLbls>
         <c:marker val="1"/>
         <c:smooth val="0"/>
-        <c:axId val="89255024"/>
-        <c:axId val="6352864"/>
+        <c:axId val="160568240"/>
+        <c:axId val="160568632"/>
       </c:lineChart>
       <c:lineChart>
         <c:grouping val="standard"/>
@@ -1251,139 +1251,6 @@
           </c:val>
           <c:smooth val="0"/>
         </c:ser>
-        <c:ser>
-          <c:idx val="2"/>
-          <c:order val="2"/>
-          <c:tx>
-            <c:strRef>
-              <c:f>Sheet1!$D$1</c:f>
-              <c:strCache>
-                <c:ptCount val="1"/>
-                <c:pt idx="0">
-                  <c:v>ThirdAxis</c:v>
-                </c:pt>
-              </c:strCache>
-            </c:strRef>
-          </c:tx>
-          <c:spPr>
-            <a:ln w="28575" cap="rnd">
-              <a:solidFill>
-                <a:schemeClr val="accent3"/>
-              </a:solidFill>
-              <a:round/>
-            </a:ln>
-            <a:effectLst/>
-          </c:spPr>
-          <c:marker>
-            <c:symbol val="none"/>
-          </c:marker>
-          <c:cat>
-            <c:numRef>
-              <c:f>Sheet1!$A$2:$A$19</c:f>
-              <c:numCache>
-                <c:formatCode>m/d/yyyy</c:formatCode>
-                <c:ptCount val="18"/>
-                <c:pt idx="0">
-                  <c:v>41033.38013888889</c:v>
-                </c:pt>
-                <c:pt idx="1">
-                  <c:v>41110.118217592593</c:v>
-                </c:pt>
-                <c:pt idx="2">
-                  <c:v>41186.856296296297</c:v>
-                </c:pt>
-                <c:pt idx="3">
-                  <c:v>41263.552708333336</c:v>
-                </c:pt>
-                <c:pt idx="4">
-                  <c:v>41340.29078703704</c:v>
-                </c:pt>
-                <c:pt idx="5">
-                  <c:v>41417.070543981485</c:v>
-                </c:pt>
-                <c:pt idx="6">
-                  <c:v>41493.808622685188</c:v>
-                </c:pt>
-                <c:pt idx="7">
-                  <c:v>41570.546701388892</c:v>
-                </c:pt>
-                <c:pt idx="8">
-                  <c:v>41647.243113425924</c:v>
-                </c:pt>
-                <c:pt idx="9">
-                  <c:v>41723.981192129628</c:v>
-                </c:pt>
-                <c:pt idx="10">
-                  <c:v>41800.760937500003</c:v>
-                </c:pt>
-                <c:pt idx="11">
-                  <c:v>41877.499016203707</c:v>
-                </c:pt>
-                <c:pt idx="12">
-                  <c:v>41954.195428240739</c:v>
-                </c:pt>
-                <c:pt idx="13">
-                  <c:v>42030.933506944442</c:v>
-                </c:pt>
-                <c:pt idx="14">
-                  <c:v>42107.713252314818</c:v>
-                </c:pt>
-                <c:pt idx="15">
-                  <c:v>42184.451331018521</c:v>
-                </c:pt>
-                <c:pt idx="16">
-                  <c:v>42261.189421296294</c:v>
-                </c:pt>
-                <c:pt idx="17">
-                  <c:v>42337.885833333334</c:v>
-                </c:pt>
-              </c:numCache>
-            </c:numRef>
-          </c:cat>
-          <c:val>
-            <c:numRef>
-              <c:f>Sheet1!$D$2:$D$19</c:f>
-              <c:numCache>
-                <c:formatCode>General</c:formatCode>
-                <c:ptCount val="18"/>
-                <c:pt idx="0">
-                  <c:v>42</c:v>
-                </c:pt>
-                <c:pt idx="2">
-                  <c:v>25</c:v>
-                </c:pt>
-                <c:pt idx="3">
-                  <c:v>662</c:v>
-                </c:pt>
-                <c:pt idx="4">
-                  <c:v>66</c:v>
-                </c:pt>
-                <c:pt idx="5">
-                  <c:v>2525</c:v>
-                </c:pt>
-                <c:pt idx="6">
-                  <c:v>1</c:v>
-                </c:pt>
-                <c:pt idx="7">
-                  <c:v>2</c:v>
-                </c:pt>
-                <c:pt idx="8">
-                  <c:v>5</c:v>
-                </c:pt>
-                <c:pt idx="10">
-                  <c:v>5</c:v>
-                </c:pt>
-                <c:pt idx="14">
-                  <c:v>5</c:v>
-                </c:pt>
-                <c:pt idx="15">
-                  <c:v>2</c:v>
-                </c:pt>
-              </c:numCache>
-            </c:numRef>
-          </c:val>
-          <c:smooth val="0"/>
-        </c:ser>
         <c:dLbls>
           <c:showLegendKey val="0"/>
           <c:showVal val="0"/>
@@ -1394,11 +1261,11 @@
         </c:dLbls>
         <c:marker val="1"/>
         <c:smooth val="0"/>
-        <c:axId val="133037912"/>
-        <c:axId val="133037528"/>
+        <c:axId val="162791304"/>
+        <c:axId val="160569024"/>
       </c:lineChart>
       <c:dateAx>
-        <c:axId val="89255024"/>
+        <c:axId val="160568240"/>
         <c:scaling>
           <c:orientation val="minMax"/>
         </c:scaling>
@@ -1441,14 +1308,14 @@
             <a:endParaRPr lang="en-US"/>
           </a:p>
         </c:txPr>
-        <c:crossAx val="6352864"/>
+        <c:crossAx val="160568632"/>
         <c:crosses val="autoZero"/>
         <c:auto val="0"/>
         <c:lblOffset val="100"/>
         <c:baseTimeUnit val="days"/>
       </c:dateAx>
       <c:valAx>
-        <c:axId val="6352864"/>
+        <c:axId val="160568632"/>
         <c:scaling>
           <c:orientation val="minMax"/>
         </c:scaling>
@@ -1499,12 +1366,12 @@
             <a:endParaRPr lang="en-US"/>
           </a:p>
         </c:txPr>
-        <c:crossAx val="89255024"/>
+        <c:crossAx val="160568240"/>
         <c:crosses val="autoZero"/>
         <c:crossBetween val="between"/>
       </c:valAx>
       <c:valAx>
-        <c:axId val="133037528"/>
+        <c:axId val="160569024"/>
         <c:scaling>
           <c:orientation val="minMax"/>
         </c:scaling>
@@ -1541,12 +1408,12 @@
             <a:endParaRPr lang="en-US"/>
           </a:p>
         </c:txPr>
-        <c:crossAx val="133037912"/>
+        <c:crossAx val="162791304"/>
         <c:crosses val="max"/>
         <c:crossBetween val="between"/>
       </c:valAx>
       <c:dateAx>
-        <c:axId val="133037912"/>
+        <c:axId val="162791304"/>
         <c:scaling>
           <c:orientation val="minMax"/>
         </c:scaling>
@@ -1556,7 +1423,7 @@
         <c:majorTickMark val="out"/>
         <c:minorTickMark val="none"/>
         <c:tickLblPos val="nextTo"/>
-        <c:crossAx val="133037528"/>
+        <c:crossAx val="160569024"/>
         <c:crosses val="autoZero"/>
         <c:auto val="1"/>
         <c:lblOffset val="100"/>
@@ -5670,7 +5537,11 @@
           <p:cNvPr id="4" name="Chart 3"/>
           <p:cNvGraphicFramePr/>
           <p:nvPr>
-            <p:extLst/>
+            <p:extLst>
+              <p:ext uri="{D42A27DB-BD31-4B8C-83A1-F6EECF244321}">
+                <p14:modId xmlns:p14="http://schemas.microsoft.com/office/powerpoint/2010/main" val="2247893617"/>
+              </p:ext>
+            </p:extLst>
           </p:nvPr>
         </p:nvGraphicFramePr>
         <p:xfrm>

</xml_diff>

<commit_message>
[FIND-1174] Switch to xy scatter charts so we can support showing dategraphs over short time periods. PowerPoint line charts use 'day' as the minimum x-axis interval, so all the points at different hours are graphed as a vertical line; xy scatter charts don't have this problem.
</commit_message>
<xml_diff>
--- a/src/main/resources/com/hp/autonomy/frontend/reports/powerpoint/templates/template.pptx
+++ b/src/main/resources/com/hp/autonomy/frontend/reports/powerpoint/templates/template.pptx
@@ -671,8 +671,185 @@
           <c:h val="0.81801631286809096"/>
         </c:manualLayout>
       </c:layout>
-      <c:lineChart>
-        <c:grouping val="standard"/>
+      <c:scatterChart>
+        <c:scatterStyle val="lineMarker"/>
+        <c:varyColors val="0"/>
+        <c:ser>
+          <c:idx val="1"/>
+          <c:order val="1"/>
+          <c:tx>
+            <c:strRef>
+              <c:f>Sheet1!$C$1</c:f>
+              <c:strCache>
+                <c:ptCount val="1"/>
+                <c:pt idx="0">
+                  <c:v>OtherAxis</c:v>
+                </c:pt>
+              </c:strCache>
+            </c:strRef>
+          </c:tx>
+          <c:spPr>
+            <a:ln w="28575" cap="rnd">
+              <a:solidFill>
+                <a:schemeClr val="accent2"/>
+              </a:solidFill>
+              <a:round/>
+            </a:ln>
+            <a:effectLst/>
+          </c:spPr>
+          <c:marker>
+            <c:symbol val="circle"/>
+            <c:size val="5"/>
+            <c:spPr>
+              <a:solidFill>
+                <a:schemeClr val="accent2"/>
+              </a:solidFill>
+              <a:ln w="9525">
+                <a:solidFill>
+                  <a:schemeClr val="accent2"/>
+                </a:solidFill>
+              </a:ln>
+              <a:effectLst/>
+            </c:spPr>
+          </c:marker>
+          <c:xVal>
+            <c:numRef>
+              <c:f>Sheet1!$A$2:$A$19</c:f>
+              <c:numCache>
+                <c:formatCode>m/d/yyyy</c:formatCode>
+                <c:ptCount val="18"/>
+                <c:pt idx="0">
+                  <c:v>41033.38013888889</c:v>
+                </c:pt>
+                <c:pt idx="1">
+                  <c:v>41110.118217592593</c:v>
+                </c:pt>
+                <c:pt idx="2">
+                  <c:v>41186.856296296297</c:v>
+                </c:pt>
+                <c:pt idx="3">
+                  <c:v>41263.552708333336</c:v>
+                </c:pt>
+                <c:pt idx="4">
+                  <c:v>41340.29078703704</c:v>
+                </c:pt>
+                <c:pt idx="5">
+                  <c:v>41417.070543981485</c:v>
+                </c:pt>
+                <c:pt idx="6">
+                  <c:v>41493.808622685188</c:v>
+                </c:pt>
+                <c:pt idx="7">
+                  <c:v>41570.546701388892</c:v>
+                </c:pt>
+                <c:pt idx="8">
+                  <c:v>41647.243113425924</c:v>
+                </c:pt>
+                <c:pt idx="9">
+                  <c:v>41723.981192129628</c:v>
+                </c:pt>
+                <c:pt idx="10">
+                  <c:v>41800.760937500003</c:v>
+                </c:pt>
+                <c:pt idx="11">
+                  <c:v>41877.499016203707</c:v>
+                </c:pt>
+                <c:pt idx="12">
+                  <c:v>41954.195428240739</c:v>
+                </c:pt>
+                <c:pt idx="13">
+                  <c:v>42030.933506944442</c:v>
+                </c:pt>
+                <c:pt idx="14">
+                  <c:v>42107.713252314818</c:v>
+                </c:pt>
+                <c:pt idx="15">
+                  <c:v>42184.451331018521</c:v>
+                </c:pt>
+                <c:pt idx="16">
+                  <c:v>42261.189421296294</c:v>
+                </c:pt>
+                <c:pt idx="17">
+                  <c:v>42337.885833333334</c:v>
+                </c:pt>
+              </c:numCache>
+            </c:numRef>
+          </c:xVal>
+          <c:yVal>
+            <c:numRef>
+              <c:f>Sheet1!$C$2:$C$19</c:f>
+              <c:numCache>
+                <c:formatCode>General</c:formatCode>
+                <c:ptCount val="18"/>
+                <c:pt idx="0">
+                  <c:v>2442</c:v>
+                </c:pt>
+                <c:pt idx="2">
+                  <c:v>6677</c:v>
+                </c:pt>
+                <c:pt idx="3">
+                  <c:v>2000</c:v>
+                </c:pt>
+                <c:pt idx="4">
+                  <c:v>400</c:v>
+                </c:pt>
+                <c:pt idx="5">
+                  <c:v>6</c:v>
+                </c:pt>
+                <c:pt idx="6">
+                  <c:v>1</c:v>
+                </c:pt>
+                <c:pt idx="7">
+                  <c:v>2</c:v>
+                </c:pt>
+                <c:pt idx="8">
+                  <c:v>3</c:v>
+                </c:pt>
+                <c:pt idx="9">
+                  <c:v>4</c:v>
+                </c:pt>
+                <c:pt idx="10">
+                  <c:v>5</c:v>
+                </c:pt>
+                <c:pt idx="11">
+                  <c:v>6</c:v>
+                </c:pt>
+                <c:pt idx="12">
+                  <c:v>5</c:v>
+                </c:pt>
+                <c:pt idx="13">
+                  <c:v>3</c:v>
+                </c:pt>
+                <c:pt idx="14">
+                  <c:v>7</c:v>
+                </c:pt>
+                <c:pt idx="15">
+                  <c:v>8</c:v>
+                </c:pt>
+                <c:pt idx="16">
+                  <c:v>5</c:v>
+                </c:pt>
+                <c:pt idx="17">
+                  <c:v>9</c:v>
+                </c:pt>
+              </c:numCache>
+            </c:numRef>
+          </c:yVal>
+          <c:smooth val="0"/>
+        </c:ser>
+        <c:dLbls>
+          <c:showLegendKey val="0"/>
+          <c:showVal val="0"/>
+          <c:showCatName val="0"/>
+          <c:showSerName val="0"/>
+          <c:showPercent val="0"/>
+          <c:showBubbleSize val="0"/>
+        </c:dLbls>
+        <c:axId val="463856744"/>
+        <c:axId val="362194048"/>
+      </c:scatterChart>
+      <c:scatterChart>
+        <c:scatterStyle val="lineMarker"/>
         <c:varyColors val="0"/>
         <c:ser>
           <c:idx val="0"/>
@@ -698,12 +875,36 @@
             <a:effectLst/>
           </c:spPr>
           <c:marker>
-            <c:symbol val="none"/>
+            <c:symbol val="circle"/>
+            <c:size val="5"/>
+            <c:spPr>
+              <a:solidFill>
+                <a:schemeClr val="accent1"/>
+              </a:solidFill>
+              <a:ln w="9525">
+                <a:solidFill>
+                  <a:schemeClr val="accent1"/>
+                </a:solidFill>
+              </a:ln>
+              <a:effectLst/>
+            </c:spPr>
           </c:marker>
           <c:dPt>
             <c:idx val="0"/>
             <c:marker>
-              <c:symbol val="none"/>
+              <c:symbol val="circle"/>
+              <c:size val="5"/>
+              <c:spPr>
+                <a:solidFill>
+                  <a:schemeClr val="accent1"/>
+                </a:solidFill>
+                <a:ln w="9525">
+                  <a:solidFill>
+                    <a:schemeClr val="accent1"/>
+                  </a:solidFill>
+                </a:ln>
+                <a:effectLst/>
+              </c:spPr>
             </c:marker>
             <c:bubble3D val="0"/>
             <c:spPr>
@@ -719,7 +920,19 @@
           <c:dPt>
             <c:idx val="1"/>
             <c:marker>
-              <c:symbol val="none"/>
+              <c:symbol val="circle"/>
+              <c:size val="5"/>
+              <c:spPr>
+                <a:solidFill>
+                  <a:schemeClr val="accent1"/>
+                </a:solidFill>
+                <a:ln w="9525">
+                  <a:solidFill>
+                    <a:schemeClr val="accent1"/>
+                  </a:solidFill>
+                </a:ln>
+                <a:effectLst/>
+              </c:spPr>
             </c:marker>
             <c:bubble3D val="0"/>
             <c:spPr>
@@ -735,7 +948,19 @@
           <c:dPt>
             <c:idx val="2"/>
             <c:marker>
-              <c:symbol val="none"/>
+              <c:symbol val="circle"/>
+              <c:size val="5"/>
+              <c:spPr>
+                <a:solidFill>
+                  <a:schemeClr val="accent1"/>
+                </a:solidFill>
+                <a:ln w="9525">
+                  <a:solidFill>
+                    <a:schemeClr val="accent1"/>
+                  </a:solidFill>
+                </a:ln>
+                <a:effectLst/>
+              </c:spPr>
             </c:marker>
             <c:bubble3D val="0"/>
             <c:spPr>
@@ -751,7 +976,19 @@
           <c:dPt>
             <c:idx val="3"/>
             <c:marker>
-              <c:symbol val="none"/>
+              <c:symbol val="circle"/>
+              <c:size val="5"/>
+              <c:spPr>
+                <a:solidFill>
+                  <a:schemeClr val="accent1"/>
+                </a:solidFill>
+                <a:ln w="9525">
+                  <a:solidFill>
+                    <a:schemeClr val="accent1"/>
+                  </a:solidFill>
+                </a:ln>
+                <a:effectLst/>
+              </c:spPr>
             </c:marker>
             <c:bubble3D val="0"/>
             <c:spPr>
@@ -767,7 +1004,19 @@
           <c:dPt>
             <c:idx val="4"/>
             <c:marker>
-              <c:symbol val="none"/>
+              <c:symbol val="circle"/>
+              <c:size val="5"/>
+              <c:spPr>
+                <a:solidFill>
+                  <a:schemeClr val="accent1"/>
+                </a:solidFill>
+                <a:ln w="9525">
+                  <a:solidFill>
+                    <a:schemeClr val="accent1"/>
+                  </a:solidFill>
+                </a:ln>
+                <a:effectLst/>
+              </c:spPr>
             </c:marker>
             <c:bubble3D val="0"/>
             <c:spPr>
@@ -783,7 +1032,19 @@
           <c:dPt>
             <c:idx val="5"/>
             <c:marker>
-              <c:symbol val="none"/>
+              <c:symbol val="circle"/>
+              <c:size val="5"/>
+              <c:spPr>
+                <a:solidFill>
+                  <a:schemeClr val="accent1"/>
+                </a:solidFill>
+                <a:ln w="9525">
+                  <a:solidFill>
+                    <a:schemeClr val="accent1"/>
+                  </a:solidFill>
+                </a:ln>
+                <a:effectLst/>
+              </c:spPr>
             </c:marker>
             <c:bubble3D val="0"/>
             <c:spPr>
@@ -799,7 +1060,19 @@
           <c:dPt>
             <c:idx val="6"/>
             <c:marker>
-              <c:symbol val="none"/>
+              <c:symbol val="circle"/>
+              <c:size val="5"/>
+              <c:spPr>
+                <a:solidFill>
+                  <a:schemeClr val="accent1"/>
+                </a:solidFill>
+                <a:ln w="9525">
+                  <a:solidFill>
+                    <a:schemeClr val="accent1"/>
+                  </a:solidFill>
+                </a:ln>
+                <a:effectLst/>
+              </c:spPr>
             </c:marker>
             <c:bubble3D val="0"/>
             <c:spPr>
@@ -815,7 +1088,19 @@
           <c:dPt>
             <c:idx val="7"/>
             <c:marker>
-              <c:symbol val="none"/>
+              <c:symbol val="circle"/>
+              <c:size val="5"/>
+              <c:spPr>
+                <a:solidFill>
+                  <a:schemeClr val="accent1"/>
+                </a:solidFill>
+                <a:ln w="9525">
+                  <a:solidFill>
+                    <a:schemeClr val="accent1"/>
+                  </a:solidFill>
+                </a:ln>
+                <a:effectLst/>
+              </c:spPr>
             </c:marker>
             <c:bubble3D val="0"/>
             <c:spPr>
@@ -831,7 +1116,19 @@
           <c:dPt>
             <c:idx val="8"/>
             <c:marker>
-              <c:symbol val="none"/>
+              <c:symbol val="circle"/>
+              <c:size val="5"/>
+              <c:spPr>
+                <a:solidFill>
+                  <a:schemeClr val="accent1"/>
+                </a:solidFill>
+                <a:ln w="9525">
+                  <a:solidFill>
+                    <a:schemeClr val="accent1"/>
+                  </a:solidFill>
+                </a:ln>
+                <a:effectLst/>
+              </c:spPr>
             </c:marker>
             <c:bubble3D val="0"/>
             <c:spPr>
@@ -847,7 +1144,19 @@
           <c:dPt>
             <c:idx val="9"/>
             <c:marker>
-              <c:symbol val="none"/>
+              <c:symbol val="circle"/>
+              <c:size val="5"/>
+              <c:spPr>
+                <a:solidFill>
+                  <a:schemeClr val="accent1"/>
+                </a:solidFill>
+                <a:ln w="9525">
+                  <a:solidFill>
+                    <a:schemeClr val="accent1"/>
+                  </a:solidFill>
+                </a:ln>
+                <a:effectLst/>
+              </c:spPr>
             </c:marker>
             <c:bubble3D val="0"/>
             <c:spPr>
@@ -863,7 +1172,19 @@
           <c:dPt>
             <c:idx val="10"/>
             <c:marker>
-              <c:symbol val="none"/>
+              <c:symbol val="circle"/>
+              <c:size val="5"/>
+              <c:spPr>
+                <a:solidFill>
+                  <a:schemeClr val="accent1"/>
+                </a:solidFill>
+                <a:ln w="9525">
+                  <a:solidFill>
+                    <a:schemeClr val="accent1"/>
+                  </a:solidFill>
+                </a:ln>
+                <a:effectLst/>
+              </c:spPr>
             </c:marker>
             <c:bubble3D val="0"/>
             <c:spPr>
@@ -879,7 +1200,19 @@
           <c:dPt>
             <c:idx val="11"/>
             <c:marker>
-              <c:symbol val="none"/>
+              <c:symbol val="circle"/>
+              <c:size val="5"/>
+              <c:spPr>
+                <a:solidFill>
+                  <a:schemeClr val="accent1"/>
+                </a:solidFill>
+                <a:ln w="9525">
+                  <a:solidFill>
+                    <a:schemeClr val="accent1"/>
+                  </a:solidFill>
+                </a:ln>
+                <a:effectLst/>
+              </c:spPr>
             </c:marker>
             <c:bubble3D val="0"/>
             <c:spPr>
@@ -895,7 +1228,19 @@
           <c:dPt>
             <c:idx val="12"/>
             <c:marker>
-              <c:symbol val="none"/>
+              <c:symbol val="circle"/>
+              <c:size val="5"/>
+              <c:spPr>
+                <a:solidFill>
+                  <a:schemeClr val="accent1"/>
+                </a:solidFill>
+                <a:ln w="9525">
+                  <a:solidFill>
+                    <a:schemeClr val="accent1"/>
+                  </a:solidFill>
+                </a:ln>
+                <a:effectLst/>
+              </c:spPr>
             </c:marker>
             <c:bubble3D val="0"/>
             <c:spPr>
@@ -911,7 +1256,19 @@
           <c:dPt>
             <c:idx val="13"/>
             <c:marker>
-              <c:symbol val="none"/>
+              <c:symbol val="circle"/>
+              <c:size val="5"/>
+              <c:spPr>
+                <a:solidFill>
+                  <a:schemeClr val="accent1"/>
+                </a:solidFill>
+                <a:ln w="9525">
+                  <a:solidFill>
+                    <a:schemeClr val="accent1"/>
+                  </a:solidFill>
+                </a:ln>
+                <a:effectLst/>
+              </c:spPr>
             </c:marker>
             <c:bubble3D val="0"/>
             <c:spPr>
@@ -927,7 +1284,19 @@
           <c:dPt>
             <c:idx val="14"/>
             <c:marker>
-              <c:symbol val="none"/>
+              <c:symbol val="circle"/>
+              <c:size val="5"/>
+              <c:spPr>
+                <a:solidFill>
+                  <a:schemeClr val="accent1"/>
+                </a:solidFill>
+                <a:ln w="9525">
+                  <a:solidFill>
+                    <a:schemeClr val="accent1"/>
+                  </a:solidFill>
+                </a:ln>
+                <a:effectLst/>
+              </c:spPr>
             </c:marker>
             <c:bubble3D val="0"/>
             <c:spPr>
@@ -943,7 +1312,19 @@
           <c:dPt>
             <c:idx val="15"/>
             <c:marker>
-              <c:symbol val="none"/>
+              <c:symbol val="circle"/>
+              <c:size val="5"/>
+              <c:spPr>
+                <a:solidFill>
+                  <a:schemeClr val="accent1"/>
+                </a:solidFill>
+                <a:ln w="9525">
+                  <a:solidFill>
+                    <a:schemeClr val="accent1"/>
+                  </a:solidFill>
+                </a:ln>
+                <a:effectLst/>
+              </c:spPr>
             </c:marker>
             <c:bubble3D val="0"/>
             <c:spPr>
@@ -956,7 +1337,7 @@
               <a:effectLst/>
             </c:spPr>
           </c:dPt>
-          <c:cat>
+          <c:xVal>
             <c:numRef>
               <c:f>Sheet1!$A$2:$A$19</c:f>
               <c:numCache>
@@ -1018,8 +1399,8 @@
                 </c:pt>
               </c:numCache>
             </c:numRef>
-          </c:cat>
-          <c:val>
+          </c:xVal>
+          <c:yVal>
             <c:numRef>
               <c:f>Sheet1!$B$2:$B$19</c:f>
               <c:numCache>
@@ -1081,7 +1462,7 @@
                 </c:pt>
               </c:numCache>
             </c:numRef>
-          </c:val>
+          </c:yVal>
           <c:smooth val="0"/>
         </c:ser>
         <c:dLbls>
@@ -1092,180 +1473,11 @@
           <c:showPercent val="0"/>
           <c:showBubbleSize val="0"/>
         </c:dLbls>
-        <c:marker val="1"/>
-        <c:smooth val="0"/>
-        <c:axId val="160568240"/>
-        <c:axId val="160568632"/>
-      </c:lineChart>
-      <c:lineChart>
-        <c:grouping val="standard"/>
-        <c:varyColors val="0"/>
-        <c:ser>
-          <c:idx val="1"/>
-          <c:order val="1"/>
-          <c:tx>
-            <c:strRef>
-              <c:f>Sheet1!$C$1</c:f>
-              <c:strCache>
-                <c:ptCount val="1"/>
-                <c:pt idx="0">
-                  <c:v>OtherAxis</c:v>
-                </c:pt>
-              </c:strCache>
-            </c:strRef>
-          </c:tx>
-          <c:spPr>
-            <a:ln w="28575" cap="rnd">
-              <a:solidFill>
-                <a:schemeClr val="accent2"/>
-              </a:solidFill>
-              <a:round/>
-            </a:ln>
-            <a:effectLst/>
-          </c:spPr>
-          <c:marker>
-            <c:symbol val="none"/>
-          </c:marker>
-          <c:cat>
-            <c:numRef>
-              <c:f>Sheet1!$A$2:$A$19</c:f>
-              <c:numCache>
-                <c:formatCode>m/d/yyyy</c:formatCode>
-                <c:ptCount val="18"/>
-                <c:pt idx="0">
-                  <c:v>41033.38013888889</c:v>
-                </c:pt>
-                <c:pt idx="1">
-                  <c:v>41110.118217592593</c:v>
-                </c:pt>
-                <c:pt idx="2">
-                  <c:v>41186.856296296297</c:v>
-                </c:pt>
-                <c:pt idx="3">
-                  <c:v>41263.552708333336</c:v>
-                </c:pt>
-                <c:pt idx="4">
-                  <c:v>41340.29078703704</c:v>
-                </c:pt>
-                <c:pt idx="5">
-                  <c:v>41417.070543981485</c:v>
-                </c:pt>
-                <c:pt idx="6">
-                  <c:v>41493.808622685188</c:v>
-                </c:pt>
-                <c:pt idx="7">
-                  <c:v>41570.546701388892</c:v>
-                </c:pt>
-                <c:pt idx="8">
-                  <c:v>41647.243113425924</c:v>
-                </c:pt>
-                <c:pt idx="9">
-                  <c:v>41723.981192129628</c:v>
-                </c:pt>
-                <c:pt idx="10">
-                  <c:v>41800.760937500003</c:v>
-                </c:pt>
-                <c:pt idx="11">
-                  <c:v>41877.499016203707</c:v>
-                </c:pt>
-                <c:pt idx="12">
-                  <c:v>41954.195428240739</c:v>
-                </c:pt>
-                <c:pt idx="13">
-                  <c:v>42030.933506944442</c:v>
-                </c:pt>
-                <c:pt idx="14">
-                  <c:v>42107.713252314818</c:v>
-                </c:pt>
-                <c:pt idx="15">
-                  <c:v>42184.451331018521</c:v>
-                </c:pt>
-                <c:pt idx="16">
-                  <c:v>42261.189421296294</c:v>
-                </c:pt>
-                <c:pt idx="17">
-                  <c:v>42337.885833333334</c:v>
-                </c:pt>
-              </c:numCache>
-            </c:numRef>
-          </c:cat>
-          <c:val>
-            <c:numRef>
-              <c:f>Sheet1!$C$2:$C$19</c:f>
-              <c:numCache>
-                <c:formatCode>General</c:formatCode>
-                <c:ptCount val="18"/>
-                <c:pt idx="0">
-                  <c:v>2442</c:v>
-                </c:pt>
-                <c:pt idx="2">
-                  <c:v>6677</c:v>
-                </c:pt>
-                <c:pt idx="3">
-                  <c:v>2000</c:v>
-                </c:pt>
-                <c:pt idx="4">
-                  <c:v>400</c:v>
-                </c:pt>
-                <c:pt idx="5">
-                  <c:v>6</c:v>
-                </c:pt>
-                <c:pt idx="6">
-                  <c:v>1</c:v>
-                </c:pt>
-                <c:pt idx="7">
-                  <c:v>2</c:v>
-                </c:pt>
-                <c:pt idx="8">
-                  <c:v>3</c:v>
-                </c:pt>
-                <c:pt idx="9">
-                  <c:v>4</c:v>
-                </c:pt>
-                <c:pt idx="10">
-                  <c:v>5</c:v>
-                </c:pt>
-                <c:pt idx="11">
-                  <c:v>6</c:v>
-                </c:pt>
-                <c:pt idx="12">
-                  <c:v>5</c:v>
-                </c:pt>
-                <c:pt idx="13">
-                  <c:v>3</c:v>
-                </c:pt>
-                <c:pt idx="14">
-                  <c:v>7</c:v>
-                </c:pt>
-                <c:pt idx="15">
-                  <c:v>8</c:v>
-                </c:pt>
-                <c:pt idx="16">
-                  <c:v>5</c:v>
-                </c:pt>
-                <c:pt idx="17">
-                  <c:v>9</c:v>
-                </c:pt>
-              </c:numCache>
-            </c:numRef>
-          </c:val>
-          <c:smooth val="0"/>
-        </c:ser>
-        <c:dLbls>
-          <c:showLegendKey val="0"/>
-          <c:showVal val="0"/>
-          <c:showCatName val="0"/>
-          <c:showSerName val="0"/>
-          <c:showPercent val="0"/>
-          <c:showBubbleSize val="0"/>
-        </c:dLbls>
-        <c:marker val="1"/>
-        <c:smooth val="0"/>
-        <c:axId val="162791304"/>
-        <c:axId val="160569024"/>
-      </c:lineChart>
-      <c:dateAx>
-        <c:axId val="160568240"/>
+        <c:axId val="532448480"/>
+        <c:axId val="364005824"/>
+      </c:scatterChart>
+      <c:valAx>
+        <c:axId val="463856744"/>
         <c:scaling>
           <c:orientation val="minMax"/>
         </c:scaling>
@@ -1308,14 +1520,12 @@
             <a:endParaRPr lang="en-US"/>
           </a:p>
         </c:txPr>
-        <c:crossAx val="160568632"/>
+        <c:crossAx val="362194048"/>
         <c:crosses val="autoZero"/>
-        <c:auto val="0"/>
-        <c:lblOffset val="100"/>
-        <c:baseTimeUnit val="days"/>
-      </c:dateAx>
+        <c:crossBetween val="midCat"/>
+      </c:valAx>
       <c:valAx>
-        <c:axId val="160568632"/>
+        <c:axId val="362194048"/>
         <c:scaling>
           <c:orientation val="minMax"/>
         </c:scaling>
@@ -1366,12 +1576,12 @@
             <a:endParaRPr lang="en-US"/>
           </a:p>
         </c:txPr>
-        <c:crossAx val="160568240"/>
+        <c:crossAx val="463856744"/>
         <c:crosses val="autoZero"/>
-        <c:crossBetween val="between"/>
+        <c:crossBetween val="midCat"/>
       </c:valAx>
       <c:valAx>
-        <c:axId val="160569024"/>
+        <c:axId val="364005824"/>
         <c:scaling>
           <c:orientation val="minMax"/>
         </c:scaling>
@@ -1408,12 +1618,12 @@
             <a:endParaRPr lang="en-US"/>
           </a:p>
         </c:txPr>
-        <c:crossAx val="162791304"/>
+        <c:crossAx val="532448480"/>
         <c:crosses val="max"/>
-        <c:crossBetween val="between"/>
+        <c:crossBetween val="midCat"/>
       </c:valAx>
-      <c:dateAx>
-        <c:axId val="162791304"/>
+      <c:valAx>
+        <c:axId val="532448480"/>
         <c:scaling>
           <c:orientation val="minMax"/>
         </c:scaling>
@@ -1423,14 +1633,9 @@
         <c:majorTickMark val="out"/>
         <c:minorTickMark val="none"/>
         <c:tickLblPos val="nextTo"/>
-        <c:crossAx val="160569024"/>
-        <c:crosses val="autoZero"/>
-        <c:auto val="1"/>
-        <c:lblOffset val="100"/>
-        <c:baseTimeUnit val="months"/>
-        <c:majorUnit val="1"/>
-        <c:minorUnit val="1"/>
-      </c:dateAx>
+        <c:crossAx val="364005824"/>
+        <c:crossBetween val="midCat"/>
+      </c:valAx>
       <c:spPr>
         <a:noFill/>
         <a:ln>
@@ -2747,7 +2952,7 @@
           <a:p>
             <a:fld id="{883BD084-2C06-41D0-A826-B3CA4EDA1986}" type="datetimeFigureOut">
               <a:rPr lang="en-GB" smtClean="0"/>
-              <a:t>16/02/2017</a:t>
+              <a:t>19/04/2017</a:t>
             </a:fld>
             <a:endParaRPr lang="en-GB"/>
           </a:p>
@@ -2917,7 +3122,7 @@
           <a:p>
             <a:fld id="{883BD084-2C06-41D0-A826-B3CA4EDA1986}" type="datetimeFigureOut">
               <a:rPr lang="en-GB" smtClean="0"/>
-              <a:t>16/02/2017</a:t>
+              <a:t>19/04/2017</a:t>
             </a:fld>
             <a:endParaRPr lang="en-GB"/>
           </a:p>
@@ -3097,7 +3302,7 @@
           <a:p>
             <a:fld id="{883BD084-2C06-41D0-A826-B3CA4EDA1986}" type="datetimeFigureOut">
               <a:rPr lang="en-GB" smtClean="0"/>
-              <a:t>16/02/2017</a:t>
+              <a:t>19/04/2017</a:t>
             </a:fld>
             <a:endParaRPr lang="en-GB"/>
           </a:p>
@@ -3267,7 +3472,7 @@
           <a:p>
             <a:fld id="{883BD084-2C06-41D0-A826-B3CA4EDA1986}" type="datetimeFigureOut">
               <a:rPr lang="en-GB" smtClean="0"/>
-              <a:t>16/02/2017</a:t>
+              <a:t>19/04/2017</a:t>
             </a:fld>
             <a:endParaRPr lang="en-GB"/>
           </a:p>
@@ -3513,7 +3718,7 @@
           <a:p>
             <a:fld id="{883BD084-2C06-41D0-A826-B3CA4EDA1986}" type="datetimeFigureOut">
               <a:rPr lang="en-GB" smtClean="0"/>
-              <a:t>16/02/2017</a:t>
+              <a:t>19/04/2017</a:t>
             </a:fld>
             <a:endParaRPr lang="en-GB"/>
           </a:p>
@@ -3745,7 +3950,7 @@
           <a:p>
             <a:fld id="{883BD084-2C06-41D0-A826-B3CA4EDA1986}" type="datetimeFigureOut">
               <a:rPr lang="en-GB" smtClean="0"/>
-              <a:t>16/02/2017</a:t>
+              <a:t>19/04/2017</a:t>
             </a:fld>
             <a:endParaRPr lang="en-GB"/>
           </a:p>
@@ -4112,7 +4317,7 @@
           <a:p>
             <a:fld id="{883BD084-2C06-41D0-A826-B3CA4EDA1986}" type="datetimeFigureOut">
               <a:rPr lang="en-GB" smtClean="0"/>
-              <a:t>16/02/2017</a:t>
+              <a:t>19/04/2017</a:t>
             </a:fld>
             <a:endParaRPr lang="en-GB"/>
           </a:p>
@@ -4230,7 +4435,7 @@
           <a:p>
             <a:fld id="{883BD084-2C06-41D0-A826-B3CA4EDA1986}" type="datetimeFigureOut">
               <a:rPr lang="en-GB" smtClean="0"/>
-              <a:t>16/02/2017</a:t>
+              <a:t>19/04/2017</a:t>
             </a:fld>
             <a:endParaRPr lang="en-GB"/>
           </a:p>
@@ -4325,7 +4530,7 @@
           <a:p>
             <a:fld id="{883BD084-2C06-41D0-A826-B3CA4EDA1986}" type="datetimeFigureOut">
               <a:rPr lang="en-GB" smtClean="0"/>
-              <a:t>16/02/2017</a:t>
+              <a:t>19/04/2017</a:t>
             </a:fld>
             <a:endParaRPr lang="en-GB"/>
           </a:p>
@@ -4602,7 +4807,7 @@
           <a:p>
             <a:fld id="{883BD084-2C06-41D0-A826-B3CA4EDA1986}" type="datetimeFigureOut">
               <a:rPr lang="en-GB" smtClean="0"/>
-              <a:t>16/02/2017</a:t>
+              <a:t>19/04/2017</a:t>
             </a:fld>
             <a:endParaRPr lang="en-GB"/>
           </a:p>
@@ -4855,7 +5060,7 @@
           <a:p>
             <a:fld id="{883BD084-2C06-41D0-A826-B3CA4EDA1986}" type="datetimeFigureOut">
               <a:rPr lang="en-GB" smtClean="0"/>
-              <a:t>16/02/2017</a:t>
+              <a:t>19/04/2017</a:t>
             </a:fld>
             <a:endParaRPr lang="en-GB"/>
           </a:p>
@@ -5068,7 +5273,7 @@
           <a:p>
             <a:fld id="{883BD084-2C06-41D0-A826-B3CA4EDA1986}" type="datetimeFigureOut">
               <a:rPr lang="en-GB" smtClean="0"/>
-              <a:t>16/02/2017</a:t>
+              <a:t>19/04/2017</a:t>
             </a:fld>
             <a:endParaRPr lang="en-GB"/>
           </a:p>
@@ -5539,7 +5744,7 @@
           <p:nvPr>
             <p:extLst>
               <p:ext uri="{D42A27DB-BD31-4B8C-83A1-F6EECF244321}">
-                <p14:modId xmlns:p14="http://schemas.microsoft.com/office/powerpoint/2010/main" val="2247893617"/>
+                <p14:modId xmlns:p14="http://schemas.microsoft.com/office/powerpoint/2010/main" val="3757438402"/>
               </p:ext>
             </p:extLst>
           </p:nvPr>

</xml_diff>